<commit_message>
* short infos on Helion and service list
</commit_message>
<xml_diff>
--- a/01 Erste Woche.pptx
+++ b/01 Erste Woche.pptx
@@ -5,21 +5,22 @@
     <p:sldMasterId id="2147483648" r:id="rId1"/>
   </p:sldMasterIdLst>
   <p:notesMasterIdLst>
-    <p:notesMasterId r:id="rId6"/>
+    <p:notesMasterId r:id="rId7"/>
   </p:notesMasterIdLst>
   <p:handoutMasterIdLst>
-    <p:handoutMasterId r:id="rId7"/>
+    <p:handoutMasterId r:id="rId8"/>
   </p:handoutMasterIdLst>
   <p:sldIdLst>
     <p:sldId id="258" r:id="rId2"/>
-    <p:sldId id="272" r:id="rId3"/>
-    <p:sldId id="273" r:id="rId4"/>
-    <p:sldId id="274" r:id="rId5"/>
+    <p:sldId id="279" r:id="rId3"/>
+    <p:sldId id="276" r:id="rId4"/>
+    <p:sldId id="278" r:id="rId5"/>
+    <p:sldId id="277" r:id="rId6"/>
   </p:sldIdLst>
   <p:sldSz cx="9144000" cy="5143500" type="screen16x9"/>
   <p:notesSz cx="6858000" cy="9144000"/>
   <p:custDataLst>
-    <p:tags r:id="rId8"/>
+    <p:tags r:id="rId9"/>
   </p:custDataLst>
   <p:defaultTextStyle>
     <a:defPPr>
@@ -118,7 +119,7 @@
   </p:defaultTextStyle>
   <p:extLst>
     <p:ext uri="{EFAFB233-063F-42B5-8137-9DF3F51BA10A}">
-      <p15:sldGuideLst xmlns="" xmlns:p15="http://schemas.microsoft.com/office/powerpoint/2012/main">
+      <p15:sldGuideLst xmlns:p15="http://schemas.microsoft.com/office/powerpoint/2012/main" xmlns="">
         <p15:guide id="1" orient="horz" pos="781">
           <p15:clr>
             <a:srgbClr val="A4A3A4"/>
@@ -207,7 +208,7 @@
       </p15:sldGuideLst>
     </p:ext>
     <p:ext uri="{2D200454-40CA-4A62-9FC3-DE9A4176ACB9}">
-      <p15:notesGuideLst xmlns="" xmlns:p15="http://schemas.microsoft.com/office/powerpoint/2012/main">
+      <p15:notesGuideLst xmlns:p15="http://schemas.microsoft.com/office/powerpoint/2012/main" xmlns="">
         <p15:guide id="1" orient="horz" pos="2676">
           <p15:clr>
             <a:srgbClr val="A4A3A4"/>
@@ -341,7 +342,7 @@
             <a:fld id="{AA592FF2-A4BD-4E98-AC76-A10007E04C10}" type="datetimeFigureOut">
               <a:rPr lang="en-US" smtClean="0"/>
               <a:pPr/>
-              <a:t>4/15/2015</a:t>
+              <a:t>4/17/2015</a:t>
             </a:fld>
             <a:endParaRPr lang="en-US" dirty="0"/>
           </a:p>
@@ -1198,7 +1199,7 @@
             <a:fld id="{AA592FF2-A4BD-4E98-AC76-A10007E04C10}" type="datetimeFigureOut">
               <a:rPr lang="en-US" smtClean="0"/>
               <a:pPr/>
-              <a:t>4/15/2015</a:t>
+              <a:t>4/17/2015</a:t>
             </a:fld>
             <a:endParaRPr lang="en-US" dirty="0"/>
           </a:p>
@@ -4353,7 +4354,7 @@
           <a:p>
             <a:fld id="{4EC5A2D1-EA3E-481A-A620-C85731C64501}" type="datetime1">
               <a:rPr lang="de-DE" smtClean="0"/>
-              <a:t>15.04.2015</a:t>
+              <a:t>17.04.2015</a:t>
             </a:fld>
             <a:endParaRPr lang="en-US" dirty="0"/>
           </a:p>
@@ -4658,7 +4659,7 @@
           <a:p>
             <a:fld id="{B0E46A81-C325-4F03-BFE0-3C0D3CA71D1F}" type="datetime1">
               <a:rPr lang="de-DE" smtClean="0"/>
-              <a:t>15.04.2015</a:t>
+              <a:t>17.04.2015</a:t>
             </a:fld>
             <a:endParaRPr lang="en-US" dirty="0"/>
           </a:p>
@@ -4963,7 +4964,7 @@
           <a:p>
             <a:fld id="{63C6F248-2593-4729-A236-668DCFE334AD}" type="datetime1">
               <a:rPr lang="de-DE" smtClean="0"/>
-              <a:t>15.04.2015</a:t>
+              <a:t>17.04.2015</a:t>
             </a:fld>
             <a:endParaRPr lang="en-US" dirty="0"/>
           </a:p>
@@ -5268,7 +5269,7 @@
           <a:p>
             <a:fld id="{8B494AC3-0151-4457-9B2C-162CCBC7E063}" type="datetime1">
               <a:rPr lang="de-DE" smtClean="0"/>
-              <a:t>15.04.2015</a:t>
+              <a:t>17.04.2015</a:t>
             </a:fld>
             <a:endParaRPr lang="en-US" dirty="0"/>
           </a:p>
@@ -5521,7 +5522,7 @@
           <a:p>
             <a:fld id="{D28AECFA-A036-4B7D-9B1C-335295FC2F75}" type="datetime1">
               <a:rPr lang="de-DE" smtClean="0"/>
-              <a:t>15.04.2015</a:t>
+              <a:t>17.04.2015</a:t>
             </a:fld>
             <a:endParaRPr lang="en-US" dirty="0"/>
           </a:p>
@@ -7852,7 +7853,7 @@
           <a:p>
             <a:fld id="{17A0FF10-8B8D-46DB-9F97-5FBA6D0A8B78}" type="datetime1">
               <a:rPr lang="de-DE" smtClean="0"/>
-              <a:t>15.04.2015</a:t>
+              <a:t>17.04.2015</a:t>
             </a:fld>
             <a:endParaRPr lang="en-US" dirty="0"/>
           </a:p>
@@ -8073,7 +8074,7 @@
           <a:p>
             <a:fld id="{33B618AC-85BD-4261-9A37-6998887D7401}" type="datetime1">
               <a:rPr lang="de-DE" smtClean="0"/>
-              <a:t>15.04.2015</a:t>
+              <a:t>17.04.2015</a:t>
             </a:fld>
             <a:endParaRPr lang="en-US" dirty="0"/>
           </a:p>
@@ -8288,7 +8289,7 @@
           <a:p>
             <a:fld id="{6131CF8A-3156-47FC-BFBC-D30FEA88E70B}" type="datetime1">
               <a:rPr lang="de-DE" smtClean="0"/>
-              <a:t>15.04.2015</a:t>
+              <a:t>17.04.2015</a:t>
             </a:fld>
             <a:endParaRPr lang="en-US" dirty="0"/>
           </a:p>
@@ -8333,8 +8334,8 @@
           <a:lstStyle/>
           <a:p>
             <a:r>
-              <a:rPr lang="en-US" smtClean="0"/>
-              <a:t>Chart </a:t>
+              <a:rPr lang="en-US" dirty="0" smtClean="0"/>
+              <a:t>Slide </a:t>
             </a:r>
             <a:fld id="{91D913BA-B0D8-4B51-9328-DFAA0B370309}" type="slidenum">
               <a:rPr lang="en-US" b="1" smtClean="0"/>
@@ -8566,7 +8567,7 @@
           <a:p>
             <a:fld id="{ED80536C-8B17-4A0D-A388-91BC2B80D8FA}" type="datetime1">
               <a:rPr lang="de-DE" smtClean="0"/>
-              <a:t>15.04.2015</a:t>
+              <a:t>17.04.2015</a:t>
             </a:fld>
             <a:endParaRPr lang="en-US" dirty="0"/>
           </a:p>
@@ -8958,7 +8959,7 @@
           <a:p>
             <a:fld id="{8C77C424-B41A-4574-9DD6-1CCADA01FDCC}" type="datetime1">
               <a:rPr lang="de-DE" smtClean="0"/>
-              <a:t>15.04.2015</a:t>
+              <a:t>17.04.2015</a:t>
             </a:fld>
             <a:endParaRPr lang="en-US" dirty="0"/>
           </a:p>
@@ -9311,7 +9312,7 @@
           <a:p>
             <a:fld id="{AA02DE05-E47D-43FA-8287-3357058A5E04}" type="datetime1">
               <a:rPr lang="de-DE" smtClean="0"/>
-              <a:t>15.04.2015</a:t>
+              <a:t>17.04.2015</a:t>
             </a:fld>
             <a:endParaRPr lang="en-US" dirty="0"/>
           </a:p>
@@ -11460,7 +11461,7 @@
       </p:grpSpPr>
       <p:sp>
         <p:nvSpPr>
-          <p:cNvPr id="8" name="Textplatzhalter 7"/>
+          <p:cNvPr id="2" name="Textplatzhalter 1"/>
           <p:cNvSpPr>
             <a:spLocks noGrp="1"/>
           </p:cNvSpPr>
@@ -11473,13 +11474,319 @@
           <a:bodyPr/>
           <a:lstStyle/>
           <a:p>
-            <a:endParaRPr lang="de-DE" dirty="0"/>
-          </a:p>
-        </p:txBody>
-      </p:sp>
-      <p:sp>
-        <p:nvSpPr>
-          <p:cNvPr id="7" name="Titel 6"/>
+            <a:r>
+              <a:rPr lang="en-US" dirty="0"/>
+              <a:t>HP’s OpenStack based cloud </a:t>
+            </a:r>
+            <a:r>
+              <a:rPr lang="en-US" dirty="0" smtClean="0"/>
+              <a:t>system</a:t>
+            </a:r>
+          </a:p>
+          <a:p>
+            <a:r>
+              <a:rPr lang="de-DE" dirty="0"/>
+              <a:t>Virtual </a:t>
+            </a:r>
+            <a:r>
+              <a:rPr lang="de-DE" dirty="0" err="1" smtClean="0"/>
+              <a:t>installation</a:t>
+            </a:r>
+            <a:r>
+              <a:rPr lang="de-DE" dirty="0"/>
+              <a:t> </a:t>
+            </a:r>
+            <a:r>
+              <a:rPr lang="de-DE" sz="1050" dirty="0"/>
+              <a:t>(</a:t>
+            </a:r>
+            <a:r>
+              <a:rPr lang="de-DE" sz="1050" dirty="0">
+                <a:hlinkClick r:id="rId2"/>
+              </a:rPr>
+              <a:t>https://docs.hpcloud.com/helion/community/install-virtual</a:t>
+            </a:r>
+            <a:r>
+              <a:rPr lang="de-DE" sz="1050" dirty="0" smtClean="0">
+                <a:hlinkClick r:id="rId2"/>
+              </a:rPr>
+              <a:t>/</a:t>
+            </a:r>
+            <a:r>
+              <a:rPr lang="de-DE" sz="1050" dirty="0" smtClean="0"/>
+              <a:t>)</a:t>
+            </a:r>
+          </a:p>
+          <a:p>
+            <a:pPr lvl="1"/>
+            <a:r>
+              <a:rPr lang="en-US" dirty="0"/>
+              <a:t>demonstration release </a:t>
+            </a:r>
+            <a:r>
+              <a:rPr lang="en-US" dirty="0" smtClean="0"/>
+              <a:t>to test </a:t>
+            </a:r>
+            <a:r>
+              <a:rPr lang="en-US" dirty="0"/>
+              <a:t>the functionality of HP </a:t>
+            </a:r>
+            <a:r>
+              <a:rPr lang="en-US" dirty="0" err="1"/>
+              <a:t>Helion</a:t>
+            </a:r>
+            <a:r>
+              <a:rPr lang="en-US" dirty="0"/>
+              <a:t> </a:t>
+            </a:r>
+            <a:endParaRPr lang="en-US" dirty="0" smtClean="0"/>
+          </a:p>
+          <a:p>
+            <a:pPr lvl="1"/>
+            <a:r>
+              <a:rPr lang="en-US" dirty="0"/>
+              <a:t>required:</a:t>
+            </a:r>
+          </a:p>
+          <a:p>
+            <a:pPr lvl="2"/>
+            <a:r>
+              <a:rPr lang="en-US" dirty="0"/>
+              <a:t>At least 64 GB of RAM</a:t>
+            </a:r>
+          </a:p>
+          <a:p>
+            <a:pPr lvl="2"/>
+            <a:r>
+              <a:rPr lang="en-US" dirty="0"/>
+              <a:t>At least 200 GB of available disk </a:t>
+            </a:r>
+            <a:r>
+              <a:rPr lang="en-US" dirty="0" smtClean="0"/>
+              <a:t>space</a:t>
+            </a:r>
+            <a:endParaRPr lang="de-DE" dirty="0" smtClean="0"/>
+          </a:p>
+          <a:p>
+            <a:endParaRPr lang="de-DE" dirty="0" smtClean="0"/>
+          </a:p>
+          <a:p>
+            <a:r>
+              <a:rPr lang="de-DE" dirty="0" err="1" smtClean="0"/>
+              <a:t>Baremetal</a:t>
+            </a:r>
+            <a:r>
+              <a:rPr lang="de-DE" dirty="0" smtClean="0"/>
+              <a:t> </a:t>
+            </a:r>
+            <a:r>
+              <a:rPr lang="de-DE" dirty="0" err="1" smtClean="0"/>
+              <a:t>installation</a:t>
+            </a:r>
+            <a:r>
+              <a:rPr lang="de-DE" dirty="0"/>
+              <a:t> </a:t>
+            </a:r>
+            <a:r>
+              <a:rPr lang="de-DE" sz="1000" dirty="0"/>
+              <a:t>(</a:t>
+            </a:r>
+            <a:r>
+              <a:rPr lang="de-DE" sz="1000" dirty="0">
+                <a:hlinkClick r:id="rId3"/>
+              </a:rPr>
+              <a:t>https://docs.hpcloud.com/helion/community/network-requirements</a:t>
+            </a:r>
+            <a:r>
+              <a:rPr lang="de-DE" sz="1000" dirty="0" smtClean="0">
+                <a:hlinkClick r:id="rId3"/>
+              </a:rPr>
+              <a:t>/</a:t>
+            </a:r>
+            <a:r>
+              <a:rPr lang="de-DE" sz="1000" dirty="0" smtClean="0"/>
+              <a:t>)</a:t>
+            </a:r>
+            <a:endParaRPr lang="de-DE" dirty="0" smtClean="0"/>
+          </a:p>
+          <a:p>
+            <a:pPr lvl="1"/>
+            <a:r>
+              <a:rPr lang="en-US" dirty="0" err="1"/>
+              <a:t>baremetal</a:t>
+            </a:r>
+            <a:r>
+              <a:rPr lang="en-US" dirty="0"/>
+              <a:t> multi-node deployment </a:t>
+            </a:r>
+            <a:r>
+              <a:rPr lang="en-US" dirty="0" smtClean="0"/>
+              <a:t>for </a:t>
+            </a:r>
+            <a:r>
+              <a:rPr lang="en-US" dirty="0"/>
+              <a:t>a </a:t>
+            </a:r>
+            <a:r>
+              <a:rPr lang="en-US" dirty="0" smtClean="0"/>
+              <a:t>small-scale cloud</a:t>
+            </a:r>
+          </a:p>
+          <a:p>
+            <a:pPr lvl="1"/>
+            <a:r>
+              <a:rPr lang="en-US" dirty="0"/>
+              <a:t>installation </a:t>
+            </a:r>
+            <a:r>
+              <a:rPr lang="en-US" dirty="0" smtClean="0"/>
+              <a:t>system (seed </a:t>
+            </a:r>
+            <a:r>
+              <a:rPr lang="en-US" dirty="0"/>
+              <a:t>cloud </a:t>
+            </a:r>
+            <a:r>
+              <a:rPr lang="en-US" dirty="0" smtClean="0"/>
+              <a:t>host) requires:</a:t>
+            </a:r>
+            <a:endParaRPr lang="en-US" dirty="0"/>
+          </a:p>
+          <a:p>
+            <a:pPr lvl="2"/>
+            <a:r>
+              <a:rPr lang="en-US" dirty="0"/>
+              <a:t>At least 64 GB of RAM</a:t>
+            </a:r>
+          </a:p>
+          <a:p>
+            <a:pPr lvl="2"/>
+            <a:r>
+              <a:rPr lang="en-US" dirty="0"/>
+              <a:t>At least 200 GB of available disk </a:t>
+            </a:r>
+            <a:r>
+              <a:rPr lang="en-US" dirty="0" smtClean="0"/>
+              <a:t>space</a:t>
+            </a:r>
+          </a:p>
+          <a:p>
+            <a:pPr marL="0" indent="0">
+              <a:buNone/>
+            </a:pPr>
+            <a:endParaRPr lang="en-US" sz="1050" dirty="0" smtClean="0">
+              <a:hlinkClick r:id="rId4"/>
+            </a:endParaRPr>
+          </a:p>
+          <a:p>
+            <a:pPr marL="0" indent="0">
+              <a:buNone/>
+            </a:pPr>
+            <a:r>
+              <a:rPr lang="en-US" sz="1050" dirty="0" smtClean="0">
+                <a:hlinkClick r:id="rId4"/>
+              </a:rPr>
+              <a:t>https</a:t>
+            </a:r>
+            <a:r>
+              <a:rPr lang="en-US" sz="1050" dirty="0">
+                <a:hlinkClick r:id="rId4"/>
+              </a:rPr>
+              <a:t>://</a:t>
+            </a:r>
+            <a:r>
+              <a:rPr lang="en-US" sz="1050" dirty="0" smtClean="0">
+                <a:hlinkClick r:id="rId4"/>
+              </a:rPr>
+              <a:t>docs.hpcloud.com/helion/community/install-overview</a:t>
+            </a:r>
+            <a:endParaRPr lang="de-DE" sz="1050" dirty="0"/>
+          </a:p>
+          <a:p>
+            <a:pPr marL="0" indent="0">
+              <a:buNone/>
+            </a:pPr>
+            <a:endParaRPr lang="en-US" dirty="0"/>
+          </a:p>
+        </p:txBody>
+      </p:sp>
+      <p:sp>
+        <p:nvSpPr>
+          <p:cNvPr id="3" name="Datumsplatzhalter 2"/>
+          <p:cNvSpPr>
+            <a:spLocks noGrp="1"/>
+          </p:cNvSpPr>
+          <p:nvPr>
+            <p:ph type="dt" sz="half" idx="14"/>
+          </p:nvPr>
+        </p:nvSpPr>
+        <p:spPr/>
+        <p:txBody>
+          <a:bodyPr/>
+          <a:lstStyle/>
+          <a:p>
+            <a:fld id="{6131CF8A-3156-47FC-BFBC-D30FEA88E70B}" type="datetime1">
+              <a:rPr lang="de-DE" smtClean="0"/>
+              <a:t>17.04.2015</a:t>
+            </a:fld>
+            <a:endParaRPr lang="en-US" dirty="0"/>
+          </a:p>
+        </p:txBody>
+      </p:sp>
+      <p:sp>
+        <p:nvSpPr>
+          <p:cNvPr id="4" name="Fußzeilenplatzhalter 3"/>
+          <p:cNvSpPr>
+            <a:spLocks noGrp="1"/>
+          </p:cNvSpPr>
+          <p:nvPr>
+            <p:ph type="ftr" sz="quarter" idx="15"/>
+          </p:nvPr>
+        </p:nvSpPr>
+        <p:spPr/>
+        <p:txBody>
+          <a:bodyPr/>
+          <a:lstStyle/>
+          <a:p>
+            <a:r>
+              <a:rPr lang="en-US" smtClean="0"/>
+              <a:t>Presentation Title</a:t>
+            </a:r>
+            <a:endParaRPr lang="en-US" dirty="0"/>
+          </a:p>
+        </p:txBody>
+      </p:sp>
+      <p:sp>
+        <p:nvSpPr>
+          <p:cNvPr id="5" name="Foliennummernplatzhalter 4"/>
+          <p:cNvSpPr>
+            <a:spLocks noGrp="1"/>
+          </p:cNvSpPr>
+          <p:nvPr>
+            <p:ph type="sldNum" sz="quarter" idx="16"/>
+          </p:nvPr>
+        </p:nvSpPr>
+        <p:spPr/>
+        <p:txBody>
+          <a:bodyPr/>
+          <a:lstStyle/>
+          <a:p>
+            <a:r>
+              <a:rPr lang="en-US" smtClean="0"/>
+              <a:t>Slide </a:t>
+            </a:r>
+            <a:fld id="{91D913BA-B0D8-4B51-9328-DFAA0B370309}" type="slidenum">
+              <a:rPr lang="en-US" b="1" smtClean="0"/>
+              <a:pPr/>
+              <a:t>2</a:t>
+            </a:fld>
+            <a:endParaRPr lang="en-US" b="1" dirty="0"/>
+          </a:p>
+        </p:txBody>
+      </p:sp>
+      <p:sp>
+        <p:nvSpPr>
+          <p:cNvPr id="6" name="Titel 5"/>
           <p:cNvSpPr>
             <a:spLocks noGrp="1"/>
           </p:cNvSpPr>
@@ -11487,106 +11794,27 @@
             <p:ph type="title"/>
           </p:nvPr>
         </p:nvSpPr>
-        <p:spPr>
-          <a:xfrm>
-            <a:off x="358776" y="108001"/>
-            <a:ext cx="6877051" cy="927588"/>
-          </a:xfrm>
-        </p:spPr>
+        <p:spPr/>
         <p:txBody>
           <a:bodyPr/>
           <a:lstStyle/>
           <a:p>
             <a:r>
-              <a:rPr lang="de-DE" dirty="0" smtClean="0"/>
+              <a:rPr lang="de-DE" dirty="0"/>
               <a:t>HP </a:t>
             </a:r>
             <a:r>
-              <a:rPr lang="de-DE" dirty="0" err="1" smtClean="0"/>
+              <a:rPr lang="de-DE" dirty="0" err="1"/>
               <a:t>Helion</a:t>
             </a:r>
             <a:endParaRPr lang="de-DE" dirty="0"/>
-          </a:p>
-        </p:txBody>
-      </p:sp>
-      <p:sp>
-        <p:nvSpPr>
-          <p:cNvPr id="4" name="Datumsplatzhalter 3"/>
-          <p:cNvSpPr>
-            <a:spLocks noGrp="1"/>
-          </p:cNvSpPr>
-          <p:nvPr>
-            <p:ph type="dt" sz="half" idx="14"/>
-          </p:nvPr>
-        </p:nvSpPr>
-        <p:spPr/>
-        <p:txBody>
-          <a:bodyPr/>
-          <a:lstStyle/>
-          <a:p>
-            <a:fld id="{B7B1F06F-C86E-44CF-BD48-CD3AF004B37D}" type="datetime1">
-              <a:rPr lang="de-DE" smtClean="0"/>
-              <a:t>15.04.2015</a:t>
-            </a:fld>
-            <a:endParaRPr lang="en-US" dirty="0"/>
-          </a:p>
-        </p:txBody>
-      </p:sp>
-      <p:sp>
-        <p:nvSpPr>
-          <p:cNvPr id="5" name="Fußzeilenplatzhalter 4"/>
-          <p:cNvSpPr>
-            <a:spLocks noGrp="1"/>
-          </p:cNvSpPr>
-          <p:nvPr>
-            <p:ph type="ftr" sz="quarter" idx="15"/>
-          </p:nvPr>
-        </p:nvSpPr>
-        <p:spPr/>
-        <p:txBody>
-          <a:bodyPr/>
-          <a:lstStyle/>
-          <a:p>
-            <a:r>
-              <a:rPr lang="en-US" smtClean="0"/>
-              <a:t>Presentation Title</a:t>
-            </a:r>
-            <a:endParaRPr lang="en-US" dirty="0"/>
-          </a:p>
-        </p:txBody>
-      </p:sp>
-      <p:sp>
-        <p:nvSpPr>
-          <p:cNvPr id="6" name="Foliennummernplatzhalter 5"/>
-          <p:cNvSpPr>
-            <a:spLocks noGrp="1"/>
-          </p:cNvSpPr>
-          <p:nvPr>
-            <p:ph type="sldNum" sz="quarter" idx="16"/>
-          </p:nvPr>
-        </p:nvSpPr>
-        <p:spPr/>
-        <p:txBody>
-          <a:bodyPr/>
-          <a:lstStyle/>
-          <a:p>
-            <a:r>
-              <a:rPr lang="en-US" smtClean="0"/>
-              <a:t>Chart </a:t>
-            </a:r>
-            <a:fld id="{91D913BA-B0D8-4B51-9328-DFAA0B370309}" type="slidenum">
-              <a:rPr lang="en-US" b="1" smtClean="0"/>
-              <a:pPr/>
-              <a:t>2</a:t>
-            </a:fld>
-            <a:endParaRPr lang="en-US" b="1" dirty="0"/>
           </a:p>
         </p:txBody>
       </p:sp>
     </p:spTree>
     <p:extLst>
       <p:ext uri="{BB962C8B-B14F-4D97-AF65-F5344CB8AC3E}">
-        <p14:creationId xmlns:p14="http://schemas.microsoft.com/office/powerpoint/2010/main" val="3110667540"/>
+        <p14:creationId xmlns:p14="http://schemas.microsoft.com/office/powerpoint/2010/main" val="3100111780"/>
       </p:ext>
     </p:extLst>
   </p:cSld>
@@ -11596,13 +11824,6 @@
   <p:transition>
     <p:fade/>
   </p:transition>
-  <p:timing>
-    <p:tnLst>
-      <p:par>
-        <p:cTn id="1" dur="indefinite" restart="never" nodeType="tmRoot"/>
-      </p:par>
-    </p:tnLst>
-  </p:timing>
 </p:sld>
 </file>
 
@@ -11625,25 +11846,6 @@
       </p:grpSpPr>
       <p:sp>
         <p:nvSpPr>
-          <p:cNvPr id="2" name="Textplatzhalter 1"/>
-          <p:cNvSpPr>
-            <a:spLocks noGrp="1"/>
-          </p:cNvSpPr>
-          <p:nvPr>
-            <p:ph type="body" sz="quarter" idx="13"/>
-          </p:nvPr>
-        </p:nvSpPr>
-        <p:spPr/>
-        <p:txBody>
-          <a:bodyPr/>
-          <a:lstStyle/>
-          <a:p>
-            <a:endParaRPr lang="de-DE"/>
-          </a:p>
-        </p:txBody>
-      </p:sp>
-      <p:sp>
-        <p:nvSpPr>
           <p:cNvPr id="3" name="Datumsplatzhalter 2"/>
           <p:cNvSpPr>
             <a:spLocks noGrp="1"/>
@@ -11659,7 +11861,7 @@
           <a:p>
             <a:fld id="{6131CF8A-3156-47FC-BFBC-D30FEA88E70B}" type="datetime1">
               <a:rPr lang="de-DE" smtClean="0"/>
-              <a:t>15.04.2015</a:t>
+              <a:t>17.04.2015</a:t>
             </a:fld>
             <a:endParaRPr lang="en-US" dirty="0"/>
           </a:p>
@@ -11705,7 +11907,7 @@
           <a:p>
             <a:r>
               <a:rPr lang="en-US" smtClean="0"/>
-              <a:t>Chart </a:t>
+              <a:t>Slide </a:t>
             </a:r>
             <a:fld id="{91D913BA-B0D8-4B51-9328-DFAA0B370309}" type="slidenum">
               <a:rPr lang="en-US" b="1" smtClean="0"/>
@@ -11732,21 +11934,510 @@
           <a:lstStyle/>
           <a:p>
             <a:r>
-              <a:rPr lang="de-DE" dirty="0" err="1" smtClean="0"/>
+              <a:rPr lang="de-DE" dirty="0" err="1"/>
               <a:t>OpenStack</a:t>
             </a:r>
             <a:r>
-              <a:rPr lang="de-DE" dirty="0" smtClean="0"/>
+              <a:rPr lang="de-DE" dirty="0"/>
               <a:t> Dienstliste</a:t>
             </a:r>
-            <a:endParaRPr lang="de-DE" dirty="0"/>
+          </a:p>
+        </p:txBody>
+      </p:sp>
+      <p:graphicFrame>
+        <p:nvGraphicFramePr>
+          <p:cNvPr id="7" name="Tabelle 6"/>
+          <p:cNvGraphicFramePr>
+            <a:graphicFrameLocks noGrp="1"/>
+          </p:cNvGraphicFramePr>
+          <p:nvPr>
+            <p:extLst>
+              <p:ext uri="{D42A27DB-BD31-4B8C-83A1-F6EECF244321}">
+                <p14:modId xmlns:p14="http://schemas.microsoft.com/office/powerpoint/2010/main" val="1582109363"/>
+              </p:ext>
+            </p:extLst>
+          </p:nvPr>
+        </p:nvGraphicFramePr>
+        <p:xfrm>
+          <a:off x="179512" y="1175508"/>
+          <a:ext cx="7200800" cy="3543201"/>
+        </p:xfrm>
+        <a:graphic>
+          <a:graphicData uri="http://schemas.openxmlformats.org/drawingml/2006/table">
+            <a:tbl>
+              <a:tblPr firstRow="1" bandRow="1">
+                <a:tableStyleId>{5C22544A-7EE6-4342-B048-85BDC9FD1C3A}</a:tableStyleId>
+              </a:tblPr>
+              <a:tblGrid>
+                <a:gridCol w="1450531"/>
+                <a:gridCol w="1167130"/>
+                <a:gridCol w="4583139"/>
+              </a:tblGrid>
+              <a:tr h="324700">
+                <a:tc>
+                  <a:txBody>
+                    <a:bodyPr/>
+                    <a:lstStyle/>
+                    <a:p>
+                      <a:r>
+                        <a:rPr lang="de-DE" sz="1200" dirty="0" smtClean="0"/>
+                        <a:t>Service </a:t>
+                      </a:r>
+                      <a:endParaRPr lang="de-DE" sz="1200" dirty="0"/>
+                    </a:p>
+                  </a:txBody>
+                  <a:tcPr/>
+                </a:tc>
+                <a:tc>
+                  <a:txBody>
+                    <a:bodyPr/>
+                    <a:lstStyle/>
+                    <a:p>
+                      <a:r>
+                        <a:rPr lang="de-DE" sz="1200" dirty="0" smtClean="0"/>
+                        <a:t>Project</a:t>
+                      </a:r>
+                      <a:endParaRPr lang="de-DE" sz="1200" dirty="0"/>
+                    </a:p>
+                  </a:txBody>
+                  <a:tcPr/>
+                </a:tc>
+                <a:tc>
+                  <a:txBody>
+                    <a:bodyPr/>
+                    <a:lstStyle/>
+                    <a:p>
+                      <a:r>
+                        <a:rPr lang="de-DE" sz="1200" dirty="0" smtClean="0"/>
+                        <a:t>Description</a:t>
+                      </a:r>
+                      <a:endParaRPr lang="de-DE" sz="1200" dirty="0"/>
+                    </a:p>
+                  </a:txBody>
+                  <a:tcPr/>
+                </a:tc>
+              </a:tr>
+              <a:tr h="324700">
+                <a:tc>
+                  <a:txBody>
+                    <a:bodyPr/>
+                    <a:lstStyle/>
+                    <a:p>
+                      <a:r>
+                        <a:rPr lang="de-DE" sz="1200" dirty="0" smtClean="0"/>
+                        <a:t>Dashboard</a:t>
+                      </a:r>
+                      <a:endParaRPr lang="de-DE" sz="1200" dirty="0"/>
+                    </a:p>
+                  </a:txBody>
+                  <a:tcPr/>
+                </a:tc>
+                <a:tc>
+                  <a:txBody>
+                    <a:bodyPr/>
+                    <a:lstStyle/>
+                    <a:p>
+                      <a:r>
+                        <a:rPr lang="de-DE" sz="1200" b="1" dirty="0" err="1" smtClean="0"/>
+                        <a:t>Horizon</a:t>
+                      </a:r>
+                      <a:endParaRPr lang="de-DE" sz="1200" b="1" dirty="0" smtClean="0"/>
+                    </a:p>
+                  </a:txBody>
+                  <a:tcPr/>
+                </a:tc>
+                <a:tc>
+                  <a:txBody>
+                    <a:bodyPr/>
+                    <a:lstStyle/>
+                    <a:p>
+                      <a:r>
+                        <a:rPr lang="en-US" sz="1200" dirty="0" smtClean="0"/>
+                        <a:t>Web-based self-service portal to interact with underlying OpenStack services</a:t>
+                      </a:r>
+                      <a:endParaRPr lang="de-DE" sz="1200" dirty="0"/>
+                    </a:p>
+                  </a:txBody>
+                  <a:tcPr/>
+                </a:tc>
+              </a:tr>
+              <a:tr h="324700">
+                <a:tc>
+                  <a:txBody>
+                    <a:bodyPr/>
+                    <a:lstStyle/>
+                    <a:p>
+                      <a:r>
+                        <a:rPr lang="de-DE" sz="1200" dirty="0" err="1" smtClean="0"/>
+                        <a:t>Compute</a:t>
+                      </a:r>
+                      <a:endParaRPr lang="de-DE" sz="1200" dirty="0"/>
+                    </a:p>
+                  </a:txBody>
+                  <a:tcPr/>
+                </a:tc>
+                <a:tc>
+                  <a:txBody>
+                    <a:bodyPr/>
+                    <a:lstStyle/>
+                    <a:p>
+                      <a:r>
+                        <a:rPr lang="de-DE" sz="1200" b="1" dirty="0" smtClean="0"/>
+                        <a:t>Nova</a:t>
+                      </a:r>
+                    </a:p>
+                  </a:txBody>
+                  <a:tcPr/>
+                </a:tc>
+                <a:tc>
+                  <a:txBody>
+                    <a:bodyPr/>
+                    <a:lstStyle/>
+                    <a:p>
+                      <a:r>
+                        <a:rPr lang="en-US" sz="1200" dirty="0" smtClean="0"/>
+                        <a:t>Manages the lifecycle of compute instances in an OpenStack environment</a:t>
+                      </a:r>
+                      <a:endParaRPr lang="de-DE" sz="1200" dirty="0"/>
+                    </a:p>
+                  </a:txBody>
+                  <a:tcPr/>
+                </a:tc>
+              </a:tr>
+              <a:tr h="324700">
+                <a:tc>
+                  <a:txBody>
+                    <a:bodyPr/>
+                    <a:lstStyle/>
+                    <a:p>
+                      <a:r>
+                        <a:rPr lang="de-DE" sz="1200" dirty="0" smtClean="0"/>
+                        <a:t>Networking</a:t>
+                      </a:r>
+                      <a:endParaRPr lang="de-DE" sz="1200" dirty="0"/>
+                    </a:p>
+                  </a:txBody>
+                  <a:tcPr/>
+                </a:tc>
+                <a:tc>
+                  <a:txBody>
+                    <a:bodyPr/>
+                    <a:lstStyle/>
+                    <a:p>
+                      <a:r>
+                        <a:rPr lang="de-DE" sz="1200" b="1" dirty="0" smtClean="0"/>
+                        <a:t>Neutron</a:t>
+                      </a:r>
+                      <a:endParaRPr lang="de-DE" sz="1200" b="1" dirty="0"/>
+                    </a:p>
+                  </a:txBody>
+                  <a:tcPr/>
+                </a:tc>
+                <a:tc>
+                  <a:txBody>
+                    <a:bodyPr/>
+                    <a:lstStyle/>
+                    <a:p>
+                      <a:r>
+                        <a:rPr lang="en-US" sz="1200" dirty="0" smtClean="0"/>
+                        <a:t>Enables Network-Connectivity-as-a-Service for other OpenStack services, such as OpenStack Compute. </a:t>
+                      </a:r>
+                      <a:endParaRPr lang="de-DE" sz="1200" dirty="0"/>
+                    </a:p>
+                  </a:txBody>
+                  <a:tcPr/>
+                </a:tc>
+              </a:tr>
+              <a:tr h="324700">
+                <a:tc>
+                  <a:txBody>
+                    <a:bodyPr/>
+                    <a:lstStyle/>
+                    <a:p>
+                      <a:r>
+                        <a:rPr lang="de-DE" sz="1200" dirty="0" err="1" smtClean="0"/>
+                        <a:t>Object</a:t>
+                      </a:r>
+                      <a:r>
+                        <a:rPr lang="de-DE" sz="1200" dirty="0" smtClean="0"/>
+                        <a:t> Storage</a:t>
+                      </a:r>
+                      <a:endParaRPr lang="de-DE" sz="1200" dirty="0"/>
+                    </a:p>
+                  </a:txBody>
+                  <a:tcPr/>
+                </a:tc>
+                <a:tc>
+                  <a:txBody>
+                    <a:bodyPr/>
+                    <a:lstStyle/>
+                    <a:p>
+                      <a:r>
+                        <a:rPr lang="de-DE" sz="1200" b="1" dirty="0" smtClean="0"/>
+                        <a:t>Swift</a:t>
+                      </a:r>
+                      <a:endParaRPr lang="de-DE" sz="1200" b="1" dirty="0"/>
+                    </a:p>
+                  </a:txBody>
+                  <a:tcPr/>
+                </a:tc>
+                <a:tc>
+                  <a:txBody>
+                    <a:bodyPr/>
+                    <a:lstStyle/>
+                    <a:p>
+                      <a:r>
+                        <a:rPr lang="en-US" sz="1200" dirty="0" smtClean="0"/>
+                        <a:t>Stores and retrieves arbitrary unstructured data objects via a RESTful, HTTP based API. </a:t>
+                      </a:r>
+                      <a:endParaRPr lang="de-DE" sz="1200" dirty="0"/>
+                    </a:p>
+                  </a:txBody>
+                  <a:tcPr/>
+                </a:tc>
+              </a:tr>
+              <a:tr h="324700">
+                <a:tc>
+                  <a:txBody>
+                    <a:bodyPr/>
+                    <a:lstStyle/>
+                    <a:p>
+                      <a:r>
+                        <a:rPr lang="de-DE" sz="1200" dirty="0" smtClean="0"/>
+                        <a:t>Block Storage</a:t>
+                      </a:r>
+                      <a:endParaRPr lang="de-DE" sz="1200" dirty="0"/>
+                    </a:p>
+                  </a:txBody>
+                  <a:tcPr/>
+                </a:tc>
+                <a:tc>
+                  <a:txBody>
+                    <a:bodyPr/>
+                    <a:lstStyle/>
+                    <a:p>
+                      <a:r>
+                        <a:rPr lang="de-DE" sz="1200" b="1" dirty="0" err="1" smtClean="0"/>
+                        <a:t>Cinder</a:t>
+                      </a:r>
+                      <a:endParaRPr lang="de-DE" sz="1200" b="1" dirty="0"/>
+                    </a:p>
+                  </a:txBody>
+                  <a:tcPr/>
+                </a:tc>
+                <a:tc>
+                  <a:txBody>
+                    <a:bodyPr/>
+                    <a:lstStyle/>
+                    <a:p>
+                      <a:r>
+                        <a:rPr lang="en-US" sz="1200" dirty="0" smtClean="0"/>
+                        <a:t>Provides persistent block storage to running instances. </a:t>
+                      </a:r>
+                      <a:endParaRPr lang="de-DE" sz="1200" dirty="0"/>
+                    </a:p>
+                  </a:txBody>
+                  <a:tcPr/>
+                </a:tc>
+              </a:tr>
+              <a:tr h="283101">
+                <a:tc>
+                  <a:txBody>
+                    <a:bodyPr/>
+                    <a:lstStyle/>
+                    <a:p>
+                      <a:r>
+                        <a:rPr lang="de-DE" sz="1200" dirty="0" smtClean="0"/>
+                        <a:t>Identity</a:t>
+                      </a:r>
+                      <a:r>
+                        <a:rPr lang="de-DE" sz="1200" baseline="0" dirty="0" smtClean="0"/>
+                        <a:t> Service</a:t>
+                      </a:r>
+                      <a:endParaRPr lang="de-DE" sz="1200" dirty="0"/>
+                    </a:p>
+                  </a:txBody>
+                  <a:tcPr/>
+                </a:tc>
+                <a:tc>
+                  <a:txBody>
+                    <a:bodyPr/>
+                    <a:lstStyle/>
+                    <a:p>
+                      <a:r>
+                        <a:rPr lang="de-DE" sz="1200" b="1" dirty="0" err="1" smtClean="0"/>
+                        <a:t>Keystone</a:t>
+                      </a:r>
+                      <a:endParaRPr lang="de-DE" sz="1200" b="1" dirty="0"/>
+                    </a:p>
+                  </a:txBody>
+                  <a:tcPr/>
+                </a:tc>
+                <a:tc>
+                  <a:txBody>
+                    <a:bodyPr/>
+                    <a:lstStyle/>
+                    <a:p>
+                      <a:r>
+                        <a:rPr lang="en-US" sz="1200" dirty="0" smtClean="0"/>
+                        <a:t>Provides an authentication and authorization service.</a:t>
+                      </a:r>
+                      <a:endParaRPr lang="de-DE" sz="1200" dirty="0"/>
+                    </a:p>
+                  </a:txBody>
+                  <a:tcPr/>
+                </a:tc>
+              </a:tr>
+              <a:tr h="324700">
+                <a:tc>
+                  <a:txBody>
+                    <a:bodyPr/>
+                    <a:lstStyle/>
+                    <a:p>
+                      <a:r>
+                        <a:rPr lang="de-DE" sz="1200" dirty="0" smtClean="0"/>
+                        <a:t>Image Service</a:t>
+                      </a:r>
+                      <a:r>
+                        <a:rPr lang="de-DE" sz="1200" baseline="0" dirty="0" smtClean="0"/>
+                        <a:t> </a:t>
+                      </a:r>
+                      <a:endParaRPr lang="de-DE" sz="1200" dirty="0"/>
+                    </a:p>
+                  </a:txBody>
+                  <a:tcPr/>
+                </a:tc>
+                <a:tc>
+                  <a:txBody>
+                    <a:bodyPr/>
+                    <a:lstStyle/>
+                    <a:p>
+                      <a:r>
+                        <a:rPr lang="de-DE" sz="1200" b="1" dirty="0" err="1" smtClean="0"/>
+                        <a:t>Glance</a:t>
+                      </a:r>
+                      <a:endParaRPr lang="de-DE" sz="1200" b="1" dirty="0"/>
+                    </a:p>
+                  </a:txBody>
+                  <a:tcPr/>
+                </a:tc>
+                <a:tc>
+                  <a:txBody>
+                    <a:bodyPr/>
+                    <a:lstStyle/>
+                    <a:p>
+                      <a:r>
+                        <a:rPr lang="en-US" sz="1200" dirty="0" smtClean="0"/>
+                        <a:t>Stores and retrieves virtual machine disk images. </a:t>
+                      </a:r>
+                      <a:endParaRPr lang="de-DE" sz="1200" dirty="0"/>
+                    </a:p>
+                  </a:txBody>
+                  <a:tcPr/>
+                </a:tc>
+              </a:tr>
+              <a:tr h="324700">
+                <a:tc>
+                  <a:txBody>
+                    <a:bodyPr/>
+                    <a:lstStyle/>
+                    <a:p>
+                      <a:r>
+                        <a:rPr lang="de-DE" sz="1200" dirty="0" err="1" smtClean="0"/>
+                        <a:t>Telemetry</a:t>
+                      </a:r>
+                      <a:endParaRPr lang="de-DE" sz="1200" dirty="0"/>
+                    </a:p>
+                  </a:txBody>
+                  <a:tcPr/>
+                </a:tc>
+                <a:tc>
+                  <a:txBody>
+                    <a:bodyPr/>
+                    <a:lstStyle/>
+                    <a:p>
+                      <a:r>
+                        <a:rPr lang="de-DE" sz="1200" b="1" dirty="0" err="1" smtClean="0"/>
+                        <a:t>Ceilometer</a:t>
+                      </a:r>
+                      <a:endParaRPr lang="de-DE" sz="1200" b="1" dirty="0"/>
+                    </a:p>
+                  </a:txBody>
+                  <a:tcPr/>
+                </a:tc>
+                <a:tc>
+                  <a:txBody>
+                    <a:bodyPr/>
+                    <a:lstStyle/>
+                    <a:p>
+                      <a:r>
+                        <a:rPr lang="en-US" sz="1200" dirty="0" smtClean="0"/>
+                        <a:t>Monitors and meters the OpenStack cloud for billing, benchmarking, scalability, and statistical purposes.</a:t>
+                      </a:r>
+                      <a:endParaRPr lang="de-DE" sz="1200" dirty="0"/>
+                    </a:p>
+                  </a:txBody>
+                  <a:tcPr/>
+                </a:tc>
+              </a:tr>
+            </a:tbl>
+          </a:graphicData>
+        </a:graphic>
+      </p:graphicFrame>
+      <p:sp>
+        <p:nvSpPr>
+          <p:cNvPr id="8" name="Textfeld 7"/>
+          <p:cNvSpPr txBox="1"/>
+          <p:nvPr/>
+        </p:nvSpPr>
+        <p:spPr bwMode="gray">
+          <a:xfrm>
+            <a:off x="271267" y="4803775"/>
+            <a:ext cx="6965029" cy="288255"/>
+          </a:xfrm>
+          <a:prstGeom prst="rect">
+            <a:avLst/>
+          </a:prstGeom>
+          <a:noFill/>
+        </p:spPr>
+        <p:txBody>
+          <a:bodyPr wrap="square" lIns="0" tIns="0" rIns="0" bIns="0" rtlCol="0">
+            <a:noAutofit/>
+          </a:bodyPr>
+          <a:lstStyle/>
+          <a:p>
+            <a:pPr>
+              <a:spcBef>
+                <a:spcPts val="300"/>
+              </a:spcBef>
+              <a:spcAft>
+                <a:spcPts val="300"/>
+              </a:spcAft>
+              <a:buClr>
+                <a:schemeClr val="accent1"/>
+              </a:buClr>
+              <a:buSzPct val="90000"/>
+            </a:pPr>
+            <a:r>
+              <a:rPr lang="de-DE" sz="1000" dirty="0">
+                <a:hlinkClick r:id="rId2"/>
+              </a:rPr>
+              <a:t>http://</a:t>
+            </a:r>
+            <a:r>
+              <a:rPr lang="de-DE" sz="1000" dirty="0" smtClean="0">
+                <a:hlinkClick r:id="rId2"/>
+              </a:rPr>
+              <a:t>docs.openstack.org/admin-guide-cloud/content/ch_getting-started-with-openstack.html</a:t>
+            </a:r>
+            <a:endParaRPr lang="de-DE" sz="1000" dirty="0" smtClean="0"/>
           </a:p>
         </p:txBody>
       </p:sp>
     </p:spTree>
     <p:extLst>
       <p:ext uri="{BB962C8B-B14F-4D97-AF65-F5344CB8AC3E}">
-        <p14:creationId xmlns:p14="http://schemas.microsoft.com/office/powerpoint/2010/main" val="1469831244"/>
+        <p14:creationId xmlns:p14="http://schemas.microsoft.com/office/powerpoint/2010/main" val="2637490600"/>
       </p:ext>
     </p:extLst>
   </p:cSld>
@@ -11778,6 +12469,218 @@
       </p:grpSpPr>
       <p:sp>
         <p:nvSpPr>
+          <p:cNvPr id="11" name="Rechteck 10"/>
+          <p:cNvSpPr/>
+          <p:nvPr/>
+        </p:nvSpPr>
+        <p:spPr bwMode="gray">
+          <a:xfrm>
+            <a:off x="107504" y="987574"/>
+            <a:ext cx="7416824" cy="144016"/>
+          </a:xfrm>
+          <a:prstGeom prst="rect">
+            <a:avLst/>
+          </a:prstGeom>
+          <a:solidFill>
+            <a:schemeClr val="bg1"/>
+          </a:solidFill>
+          <a:ln>
+            <a:solidFill>
+              <a:schemeClr val="bg1"/>
+            </a:solidFill>
+          </a:ln>
+        </p:spPr>
+        <p:style>
+          <a:lnRef idx="2">
+            <a:schemeClr val="accent1">
+              <a:shade val="50000"/>
+            </a:schemeClr>
+          </a:lnRef>
+          <a:fillRef idx="1">
+            <a:schemeClr val="accent1"/>
+          </a:fillRef>
+          <a:effectRef idx="0">
+            <a:schemeClr val="accent1"/>
+          </a:effectRef>
+          <a:fontRef idx="minor">
+            <a:schemeClr val="lt1"/>
+          </a:fontRef>
+        </p:style>
+        <p:txBody>
+          <a:bodyPr rot="0" spcFirstLastPara="0" vertOverflow="overflow" horzOverflow="overflow" vert="horz" wrap="square" lIns="108000" tIns="72000" rIns="108000" bIns="72000" numCol="1" spcCol="0" rtlCol="0" fromWordArt="0" anchor="ctr" anchorCtr="0" forceAA="0" compatLnSpc="1">
+            <a:prstTxWarp prst="textNoShape">
+              <a:avLst/>
+            </a:prstTxWarp>
+            <a:noAutofit/>
+          </a:bodyPr>
+          <a:lstStyle/>
+          <a:p>
+            <a:pPr algn="ctr">
+              <a:spcBef>
+                <a:spcPts val="300"/>
+              </a:spcBef>
+              <a:spcAft>
+                <a:spcPts val="300"/>
+              </a:spcAft>
+            </a:pPr>
+            <a:endParaRPr lang="de-DE" sz="1200" b="1" dirty="0" err="1" smtClean="0">
+              <a:solidFill>
+                <a:schemeClr val="bg1"/>
+              </a:solidFill>
+            </a:endParaRPr>
+          </a:p>
+        </p:txBody>
+      </p:sp>
+      <p:sp>
+        <p:nvSpPr>
+          <p:cNvPr id="3" name="Datumsplatzhalter 2"/>
+          <p:cNvSpPr>
+            <a:spLocks noGrp="1"/>
+          </p:cNvSpPr>
+          <p:nvPr>
+            <p:ph type="dt" sz="half" idx="14"/>
+          </p:nvPr>
+        </p:nvSpPr>
+        <p:spPr/>
+        <p:txBody>
+          <a:bodyPr/>
+          <a:lstStyle/>
+          <a:p>
+            <a:fld id="{6131CF8A-3156-47FC-BFBC-D30FEA88E70B}" type="datetime1">
+              <a:rPr lang="de-DE" smtClean="0"/>
+              <a:t>17.04.2015</a:t>
+            </a:fld>
+            <a:endParaRPr lang="en-US" dirty="0"/>
+          </a:p>
+        </p:txBody>
+      </p:sp>
+      <p:sp>
+        <p:nvSpPr>
+          <p:cNvPr id="4" name="Fußzeilenplatzhalter 3"/>
+          <p:cNvSpPr>
+            <a:spLocks noGrp="1"/>
+          </p:cNvSpPr>
+          <p:nvPr>
+            <p:ph type="ftr" sz="quarter" idx="15"/>
+          </p:nvPr>
+        </p:nvSpPr>
+        <p:spPr/>
+        <p:txBody>
+          <a:bodyPr/>
+          <a:lstStyle/>
+          <a:p>
+            <a:r>
+              <a:rPr lang="en-US" smtClean="0"/>
+              <a:t>Presentation Title</a:t>
+            </a:r>
+            <a:endParaRPr lang="en-US" dirty="0"/>
+          </a:p>
+        </p:txBody>
+      </p:sp>
+      <p:sp>
+        <p:nvSpPr>
+          <p:cNvPr id="5" name="Foliennummernplatzhalter 4"/>
+          <p:cNvSpPr>
+            <a:spLocks noGrp="1"/>
+          </p:cNvSpPr>
+          <p:nvPr>
+            <p:ph type="sldNum" sz="quarter" idx="16"/>
+          </p:nvPr>
+        </p:nvSpPr>
+        <p:spPr/>
+        <p:txBody>
+          <a:bodyPr/>
+          <a:lstStyle/>
+          <a:p>
+            <a:r>
+              <a:rPr lang="en-US" smtClean="0"/>
+              <a:t>Slide </a:t>
+            </a:r>
+            <a:fld id="{91D913BA-B0D8-4B51-9328-DFAA0B370309}" type="slidenum">
+              <a:rPr lang="en-US" b="1" smtClean="0"/>
+              <a:pPr/>
+              <a:t>4</a:t>
+            </a:fld>
+            <a:endParaRPr lang="en-US" b="1" dirty="0"/>
+          </a:p>
+        </p:txBody>
+      </p:sp>
+      <p:pic>
+        <p:nvPicPr>
+          <p:cNvPr id="1026" name="Picture 2" descr="http://docs.openstack.org/admin-guide-cloud/content/figures/1/figures/openstack_havana_conceptual_arch.png"/>
+          <p:cNvPicPr>
+            <a:picLocks noChangeAspect="1" noChangeArrowheads="1"/>
+          </p:cNvPicPr>
+          <p:nvPr/>
+        </p:nvPicPr>
+        <p:blipFill>
+          <a:blip r:embed="rId2">
+            <a:extLst>
+              <a:ext uri="{28A0092B-C50C-407E-A947-70E740481C1C}">
+                <a14:useLocalDpi xmlns:a14="http://schemas.microsoft.com/office/drawing/2010/main" val="0"/>
+              </a:ext>
+            </a:extLst>
+          </a:blip>
+          <a:srcRect/>
+          <a:stretch>
+            <a:fillRect/>
+          </a:stretch>
+        </p:blipFill>
+        <p:spPr bwMode="auto">
+          <a:xfrm>
+            <a:off x="1043608" y="175291"/>
+            <a:ext cx="5328592" cy="4850942"/>
+          </a:xfrm>
+          <a:prstGeom prst="rect">
+            <a:avLst/>
+          </a:prstGeom>
+          <a:noFill/>
+          <a:extLst>
+            <a:ext uri="{909E8E84-426E-40DD-AFC4-6F175D3DCCD1}">
+              <a14:hiddenFill xmlns:a14="http://schemas.microsoft.com/office/drawing/2010/main">
+                <a:solidFill>
+                  <a:srgbClr val="FFFFFF"/>
+                </a:solidFill>
+              </a14:hiddenFill>
+            </a:ext>
+          </a:extLst>
+        </p:spPr>
+      </p:pic>
+    </p:spTree>
+    <p:extLst>
+      <p:ext uri="{BB962C8B-B14F-4D97-AF65-F5344CB8AC3E}">
+        <p14:creationId xmlns:p14="http://schemas.microsoft.com/office/powerpoint/2010/main" val="162225777"/>
+      </p:ext>
+    </p:extLst>
+  </p:cSld>
+  <p:clrMapOvr>
+    <a:masterClrMapping/>
+  </p:clrMapOvr>
+  <p:transition>
+    <p:fade/>
+  </p:transition>
+</p:sld>
+</file>
+
+<file path=ppt/slides/slide5.xml><?xml version="1.0" encoding="utf-8"?>
+<p:sld xmlns:a="http://schemas.openxmlformats.org/drawingml/2006/main" xmlns:r="http://schemas.openxmlformats.org/officeDocument/2006/relationships" xmlns:p="http://schemas.openxmlformats.org/presentationml/2006/main">
+  <p:cSld>
+    <p:spTree>
+      <p:nvGrpSpPr>
+        <p:cNvPr id="1" name=""/>
+        <p:cNvGrpSpPr/>
+        <p:nvPr/>
+      </p:nvGrpSpPr>
+      <p:grpSpPr>
+        <a:xfrm>
+          <a:off x="0" y="0"/>
+          <a:ext cx="0" cy="0"/>
+          <a:chOff x="0" y="0"/>
+          <a:chExt cx="0" cy="0"/>
+        </a:xfrm>
+      </p:grpSpPr>
+      <p:sp>
+        <p:nvSpPr>
           <p:cNvPr id="2" name="Textplatzhalter 1"/>
           <p:cNvSpPr>
             <a:spLocks noGrp="1"/>
@@ -11791,7 +12694,7 @@
           <a:bodyPr/>
           <a:lstStyle/>
           <a:p>
-            <a:endParaRPr lang="de-DE"/>
+            <a:endParaRPr lang="de-DE" dirty="0"/>
           </a:p>
         </p:txBody>
       </p:sp>
@@ -11812,7 +12715,7 @@
           <a:p>
             <a:fld id="{6131CF8A-3156-47FC-BFBC-D30FEA88E70B}" type="datetime1">
               <a:rPr lang="de-DE" smtClean="0"/>
-              <a:t>15.04.2015</a:t>
+              <a:t>17.04.2015</a:t>
             </a:fld>
             <a:endParaRPr lang="en-US" dirty="0"/>
           </a:p>
@@ -11858,12 +12761,12 @@
           <a:p>
             <a:r>
               <a:rPr lang="en-US" smtClean="0"/>
-              <a:t>Chart </a:t>
+              <a:t>Slide </a:t>
             </a:r>
             <a:fld id="{91D913BA-B0D8-4B51-9328-DFAA0B370309}" type="slidenum">
               <a:rPr lang="en-US" b="1" smtClean="0"/>
               <a:pPr/>
-              <a:t>4</a:t>
+              <a:t>5</a:t>
             </a:fld>
             <a:endParaRPr lang="en-US" b="1" dirty="0"/>
           </a:p>
@@ -11885,15 +12788,15 @@
           <a:lstStyle/>
           <a:p>
             <a:r>
-              <a:rPr lang="de-DE" dirty="0" err="1" smtClean="0"/>
+              <a:rPr lang="de-DE" dirty="0" err="1"/>
               <a:t>Nested</a:t>
             </a:r>
             <a:r>
-              <a:rPr lang="de-DE" dirty="0" smtClean="0"/>
+              <a:rPr lang="de-DE" dirty="0"/>
               <a:t> </a:t>
             </a:r>
             <a:r>
-              <a:rPr lang="de-DE" dirty="0" err="1" smtClean="0"/>
+              <a:rPr lang="de-DE" dirty="0" err="1"/>
               <a:t>Virtualization</a:t>
             </a:r>
             <a:endParaRPr lang="de-DE" dirty="0"/>
@@ -11903,7 +12806,7 @@
     </p:spTree>
     <p:extLst>
       <p:ext uri="{BB962C8B-B14F-4D97-AF65-F5344CB8AC3E}">
-        <p14:creationId xmlns:p14="http://schemas.microsoft.com/office/powerpoint/2010/main" val="3649221881"/>
+        <p14:creationId xmlns:p14="http://schemas.microsoft.com/office/powerpoint/2010/main" val="2734943179"/>
       </p:ext>
     </p:extLst>
   </p:cSld>
@@ -12242,7 +13145,7 @@
   <a:extraClrSchemeLst/>
   <a:extLst>
     <a:ext uri="{05A4C25C-085E-4340-85A3-A5531E510DB2}">
-      <thm15:themeFamily xmlns="" xmlns:thm15="http://schemas.microsoft.com/office/thememl/2012/main" name="TEMPLATE_HPI_05_EXP" id="{EEEEA749-3836-4DC6-BA52-AE8D0ADE122A}" vid="{1AF48529-3759-4302-91D0-708D448B88CB}"/>
+      <thm15:themeFamily xmlns:thm15="http://schemas.microsoft.com/office/thememl/2012/main" xmlns="" name="TEMPLATE_HPI_05_EXP" id="{EEEEA749-3836-4DC6-BA52-AE8D0ADE122A}" vid="{1AF48529-3759-4302-91D0-708D448B88CB}"/>
     </a:ext>
   </a:extLst>
 </a:theme>

</xml_diff>

<commit_message>
* added nested VM stuff to ppt
</commit_message>
<xml_diff>
--- a/01 Erste Woche.pptx
+++ b/01 Erste Woche.pptx
@@ -5,10 +5,10 @@
     <p:sldMasterId id="2147483648" r:id="rId1"/>
   </p:sldMasterIdLst>
   <p:notesMasterIdLst>
-    <p:notesMasterId r:id="rId7"/>
+    <p:notesMasterId r:id="rId8"/>
   </p:notesMasterIdLst>
   <p:handoutMasterIdLst>
-    <p:handoutMasterId r:id="rId8"/>
+    <p:handoutMasterId r:id="rId9"/>
   </p:handoutMasterIdLst>
   <p:sldIdLst>
     <p:sldId id="258" r:id="rId2"/>
@@ -16,11 +16,12 @@
     <p:sldId id="276" r:id="rId4"/>
     <p:sldId id="278" r:id="rId5"/>
     <p:sldId id="277" r:id="rId6"/>
+    <p:sldId id="280" r:id="rId7"/>
   </p:sldIdLst>
   <p:sldSz cx="9144000" cy="5143500" type="screen16x9"/>
   <p:notesSz cx="6858000" cy="9144000"/>
   <p:custDataLst>
-    <p:tags r:id="rId9"/>
+    <p:tags r:id="rId10"/>
   </p:custDataLst>
   <p:defaultTextStyle>
     <a:defPPr>
@@ -119,7 +120,7 @@
   </p:defaultTextStyle>
   <p:extLst>
     <p:ext uri="{EFAFB233-063F-42B5-8137-9DF3F51BA10A}">
-      <p15:sldGuideLst xmlns:p15="http://schemas.microsoft.com/office/powerpoint/2012/main" xmlns="">
+      <p15:sldGuideLst xmlns="" xmlns:p15="http://schemas.microsoft.com/office/powerpoint/2012/main">
         <p15:guide id="1" orient="horz" pos="781">
           <p15:clr>
             <a:srgbClr val="A4A3A4"/>
@@ -208,7 +209,7 @@
       </p15:sldGuideLst>
     </p:ext>
     <p:ext uri="{2D200454-40CA-4A62-9FC3-DE9A4176ACB9}">
-      <p15:notesGuideLst xmlns:p15="http://schemas.microsoft.com/office/powerpoint/2012/main" xmlns="">
+      <p15:notesGuideLst xmlns="" xmlns:p15="http://schemas.microsoft.com/office/powerpoint/2012/main">
         <p15:guide id="1" orient="horz" pos="2676">
           <p15:clr>
             <a:srgbClr val="A4A3A4"/>
@@ -342,7 +343,7 @@
             <a:fld id="{AA592FF2-A4BD-4E98-AC76-A10007E04C10}" type="datetimeFigureOut">
               <a:rPr lang="en-US" smtClean="0"/>
               <a:pPr/>
-              <a:t>4/17/2015</a:t>
+              <a:t>4/21/2015</a:t>
             </a:fld>
             <a:endParaRPr lang="en-US" dirty="0"/>
           </a:p>
@@ -1199,7 +1200,7 @@
             <a:fld id="{AA592FF2-A4BD-4E98-AC76-A10007E04C10}" type="datetimeFigureOut">
               <a:rPr lang="en-US" smtClean="0"/>
               <a:pPr/>
-              <a:t>4/17/2015</a:t>
+              <a:t>4/21/2015</a:t>
             </a:fld>
             <a:endParaRPr lang="en-US" dirty="0"/>
           </a:p>
@@ -4354,7 +4355,7 @@
           <a:p>
             <a:fld id="{4EC5A2D1-EA3E-481A-A620-C85731C64501}" type="datetime1">
               <a:rPr lang="de-DE" smtClean="0"/>
-              <a:t>17.04.2015</a:t>
+              <a:t>21.04.2015</a:t>
             </a:fld>
             <a:endParaRPr lang="en-US" dirty="0"/>
           </a:p>
@@ -4659,7 +4660,7 @@
           <a:p>
             <a:fld id="{B0E46A81-C325-4F03-BFE0-3C0D3CA71D1F}" type="datetime1">
               <a:rPr lang="de-DE" smtClean="0"/>
-              <a:t>17.04.2015</a:t>
+              <a:t>21.04.2015</a:t>
             </a:fld>
             <a:endParaRPr lang="en-US" dirty="0"/>
           </a:p>
@@ -4964,7 +4965,7 @@
           <a:p>
             <a:fld id="{63C6F248-2593-4729-A236-668DCFE334AD}" type="datetime1">
               <a:rPr lang="de-DE" smtClean="0"/>
-              <a:t>17.04.2015</a:t>
+              <a:t>21.04.2015</a:t>
             </a:fld>
             <a:endParaRPr lang="en-US" dirty="0"/>
           </a:p>
@@ -5269,7 +5270,7 @@
           <a:p>
             <a:fld id="{8B494AC3-0151-4457-9B2C-162CCBC7E063}" type="datetime1">
               <a:rPr lang="de-DE" smtClean="0"/>
-              <a:t>17.04.2015</a:t>
+              <a:t>21.04.2015</a:t>
             </a:fld>
             <a:endParaRPr lang="en-US" dirty="0"/>
           </a:p>
@@ -5522,7 +5523,7 @@
           <a:p>
             <a:fld id="{D28AECFA-A036-4B7D-9B1C-335295FC2F75}" type="datetime1">
               <a:rPr lang="de-DE" smtClean="0"/>
-              <a:t>17.04.2015</a:t>
+              <a:t>21.04.2015</a:t>
             </a:fld>
             <a:endParaRPr lang="en-US" dirty="0"/>
           </a:p>
@@ -7853,7 +7854,7 @@
           <a:p>
             <a:fld id="{17A0FF10-8B8D-46DB-9F97-5FBA6D0A8B78}" type="datetime1">
               <a:rPr lang="de-DE" smtClean="0"/>
-              <a:t>17.04.2015</a:t>
+              <a:t>21.04.2015</a:t>
             </a:fld>
             <a:endParaRPr lang="en-US" dirty="0"/>
           </a:p>
@@ -8074,7 +8075,7 @@
           <a:p>
             <a:fld id="{33B618AC-85BD-4261-9A37-6998887D7401}" type="datetime1">
               <a:rPr lang="de-DE" smtClean="0"/>
-              <a:t>17.04.2015</a:t>
+              <a:t>21.04.2015</a:t>
             </a:fld>
             <a:endParaRPr lang="en-US" dirty="0"/>
           </a:p>
@@ -8289,7 +8290,7 @@
           <a:p>
             <a:fld id="{6131CF8A-3156-47FC-BFBC-D30FEA88E70B}" type="datetime1">
               <a:rPr lang="de-DE" smtClean="0"/>
-              <a:t>17.04.2015</a:t>
+              <a:t>21.04.2015</a:t>
             </a:fld>
             <a:endParaRPr lang="en-US" dirty="0"/>
           </a:p>
@@ -8567,7 +8568,7 @@
           <a:p>
             <a:fld id="{ED80536C-8B17-4A0D-A388-91BC2B80D8FA}" type="datetime1">
               <a:rPr lang="de-DE" smtClean="0"/>
-              <a:t>17.04.2015</a:t>
+              <a:t>21.04.2015</a:t>
             </a:fld>
             <a:endParaRPr lang="en-US" dirty="0"/>
           </a:p>
@@ -8959,7 +8960,7 @@
           <a:p>
             <a:fld id="{8C77C424-B41A-4574-9DD6-1CCADA01FDCC}" type="datetime1">
               <a:rPr lang="de-DE" smtClean="0"/>
-              <a:t>17.04.2015</a:t>
+              <a:t>21.04.2015</a:t>
             </a:fld>
             <a:endParaRPr lang="en-US" dirty="0"/>
           </a:p>
@@ -9312,7 +9313,7 @@
           <a:p>
             <a:fld id="{AA02DE05-E47D-43FA-8287-3357058A5E04}" type="datetime1">
               <a:rPr lang="de-DE" smtClean="0"/>
-              <a:t>17.04.2015</a:t>
+              <a:t>21.04.2015</a:t>
             </a:fld>
             <a:endParaRPr lang="en-US" dirty="0"/>
           </a:p>
@@ -11552,14 +11553,18 @@
             <a:pPr lvl="2"/>
             <a:r>
               <a:rPr lang="en-US" dirty="0"/>
-              <a:t>At least 64 GB of RAM</a:t>
+              <a:t>At least 64 GB of RAM (Works on 16GB in talk from Chris Cannon)</a:t>
             </a:r>
           </a:p>
           <a:p>
             <a:pPr lvl="2"/>
             <a:r>
+              <a:rPr lang="en-US" dirty="0" smtClean="0"/>
+              <a:t>At </a:t>
+            </a:r>
+            <a:r>
               <a:rPr lang="en-US" dirty="0"/>
-              <a:t>At least 200 GB of available disk </a:t>
+              <a:t>least 200 GB of available disk </a:t>
             </a:r>
             <a:r>
               <a:rPr lang="en-US" dirty="0" smtClean="0"/>
@@ -11727,7 +11732,7 @@
           <a:p>
             <a:fld id="{6131CF8A-3156-47FC-BFBC-D30FEA88E70B}" type="datetime1">
               <a:rPr lang="de-DE" smtClean="0"/>
-              <a:t>17.04.2015</a:t>
+              <a:t>21.04.2015</a:t>
             </a:fld>
             <a:endParaRPr lang="en-US" dirty="0"/>
           </a:p>
@@ -11861,7 +11866,7 @@
           <a:p>
             <a:fld id="{6131CF8A-3156-47FC-BFBC-D30FEA88E70B}" type="datetime1">
               <a:rPr lang="de-DE" smtClean="0"/>
-              <a:t>17.04.2015</a:t>
+              <a:t>21.04.2015</a:t>
             </a:fld>
             <a:endParaRPr lang="en-US" dirty="0"/>
           </a:p>
@@ -12548,7 +12553,7 @@
           <a:p>
             <a:fld id="{6131CF8A-3156-47FC-BFBC-D30FEA88E70B}" type="datetime1">
               <a:rPr lang="de-DE" smtClean="0"/>
-              <a:t>17.04.2015</a:t>
+              <a:t>21.04.2015</a:t>
             </a:fld>
             <a:endParaRPr lang="en-US" dirty="0"/>
           </a:p>
@@ -12694,6 +12699,65 @@
           <a:bodyPr/>
           <a:lstStyle/>
           <a:p>
+            <a:r>
+              <a:rPr lang="de-DE" dirty="0" smtClean="0"/>
+              <a:t>Mit </a:t>
+            </a:r>
+            <a:r>
+              <a:rPr lang="de-DE" dirty="0"/>
+              <a:t>Linux unter KVM</a:t>
+            </a:r>
+          </a:p>
+          <a:p>
+            <a:pPr marL="0" indent="0">
+              <a:buNone/>
+            </a:pPr>
+            <a:endParaRPr lang="de-DE" dirty="0"/>
+          </a:p>
+          <a:p>
+            <a:r>
+              <a:rPr lang="de-DE" dirty="0" smtClean="0"/>
+              <a:t>Dokumentation </a:t>
+            </a:r>
+            <a:r>
+              <a:rPr lang="de-DE" dirty="0"/>
+              <a:t>für </a:t>
+            </a:r>
+            <a:r>
+              <a:rPr lang="de-DE" dirty="0" err="1"/>
+              <a:t>RedHat</a:t>
+            </a:r>
+            <a:r>
+              <a:rPr lang="de-DE" dirty="0"/>
+              <a:t>, aber </a:t>
+            </a:r>
+            <a:r>
+              <a:rPr lang="de-DE" dirty="0" smtClean="0"/>
+              <a:t>inzwischen </a:t>
+            </a:r>
+            <a:r>
+              <a:rPr lang="de-DE" dirty="0"/>
+              <a:t>recht lange im Kernel </a:t>
+            </a:r>
+            <a:r>
+              <a:rPr lang="de-DE" dirty="0" smtClean="0">
+                <a:sym typeface="Wingdings" panose="05000000000000000000" pitchFamily="2" charset="2"/>
+              </a:rPr>
+              <a:t></a:t>
+            </a:r>
+            <a:r>
+              <a:rPr lang="de-DE" dirty="0" smtClean="0"/>
+              <a:t> </a:t>
+            </a:r>
+            <a:r>
+              <a:rPr lang="de-DE" dirty="0"/>
+              <a:t>sollte unter Ubuntu auch funktionieren</a:t>
+            </a:r>
+          </a:p>
+          <a:p>
+            <a:pPr marL="0" indent="0">
+              <a:buNone/>
+            </a:pPr>
             <a:endParaRPr lang="de-DE" dirty="0"/>
           </a:p>
         </p:txBody>
@@ -12715,7 +12779,7 @@
           <a:p>
             <a:fld id="{6131CF8A-3156-47FC-BFBC-D30FEA88E70B}" type="datetime1">
               <a:rPr lang="de-DE" smtClean="0"/>
-              <a:t>17.04.2015</a:t>
+              <a:t>21.04.2015</a:t>
             </a:fld>
             <a:endParaRPr lang="en-US" dirty="0"/>
           </a:p>
@@ -12807,6 +12871,276 @@
     <p:extLst>
       <p:ext uri="{BB962C8B-B14F-4D97-AF65-F5344CB8AC3E}">
         <p14:creationId xmlns:p14="http://schemas.microsoft.com/office/powerpoint/2010/main" val="2734943179"/>
+      </p:ext>
+    </p:extLst>
+  </p:cSld>
+  <p:clrMapOvr>
+    <a:masterClrMapping/>
+  </p:clrMapOvr>
+  <p:transition>
+    <p:fade/>
+  </p:transition>
+</p:sld>
+</file>
+
+<file path=ppt/slides/slide6.xml><?xml version="1.0" encoding="utf-8"?>
+<p:sld xmlns:a="http://schemas.openxmlformats.org/drawingml/2006/main" xmlns:r="http://schemas.openxmlformats.org/officeDocument/2006/relationships" xmlns:p="http://schemas.openxmlformats.org/presentationml/2006/main">
+  <p:cSld>
+    <p:spTree>
+      <p:nvGrpSpPr>
+        <p:cNvPr id="1" name=""/>
+        <p:cNvGrpSpPr/>
+        <p:nvPr/>
+      </p:nvGrpSpPr>
+      <p:grpSpPr>
+        <a:xfrm>
+          <a:off x="0" y="0"/>
+          <a:ext cx="0" cy="0"/>
+          <a:chOff x="0" y="0"/>
+          <a:chExt cx="0" cy="0"/>
+        </a:xfrm>
+      </p:grpSpPr>
+      <p:sp>
+        <p:nvSpPr>
+          <p:cNvPr id="2" name="Textplatzhalter 1"/>
+          <p:cNvSpPr>
+            <a:spLocks noGrp="1"/>
+          </p:cNvSpPr>
+          <p:nvPr>
+            <p:ph type="body" sz="quarter" idx="13"/>
+          </p:nvPr>
+        </p:nvSpPr>
+        <p:spPr/>
+        <p:txBody>
+          <a:bodyPr/>
+          <a:lstStyle/>
+          <a:p>
+            <a:endParaRPr lang="de-DE" dirty="0"/>
+          </a:p>
+        </p:txBody>
+      </p:sp>
+      <p:sp>
+        <p:nvSpPr>
+          <p:cNvPr id="3" name="Datumsplatzhalter 2"/>
+          <p:cNvSpPr>
+            <a:spLocks noGrp="1"/>
+          </p:cNvSpPr>
+          <p:nvPr>
+            <p:ph type="dt" sz="half" idx="14"/>
+          </p:nvPr>
+        </p:nvSpPr>
+        <p:spPr/>
+        <p:txBody>
+          <a:bodyPr/>
+          <a:lstStyle/>
+          <a:p>
+            <a:fld id="{6131CF8A-3156-47FC-BFBC-D30FEA88E70B}" type="datetime1">
+              <a:rPr lang="de-DE" smtClean="0"/>
+              <a:t>21.04.2015</a:t>
+            </a:fld>
+            <a:endParaRPr lang="en-US" dirty="0"/>
+          </a:p>
+        </p:txBody>
+      </p:sp>
+      <p:sp>
+        <p:nvSpPr>
+          <p:cNvPr id="4" name="Fußzeilenplatzhalter 3"/>
+          <p:cNvSpPr>
+            <a:spLocks noGrp="1"/>
+          </p:cNvSpPr>
+          <p:nvPr>
+            <p:ph type="ftr" sz="quarter" idx="15"/>
+          </p:nvPr>
+        </p:nvSpPr>
+        <p:spPr/>
+        <p:txBody>
+          <a:bodyPr/>
+          <a:lstStyle/>
+          <a:p>
+            <a:r>
+              <a:rPr lang="en-US" smtClean="0"/>
+              <a:t>Presentation Title</a:t>
+            </a:r>
+            <a:endParaRPr lang="en-US" dirty="0"/>
+          </a:p>
+        </p:txBody>
+      </p:sp>
+      <p:sp>
+        <p:nvSpPr>
+          <p:cNvPr id="5" name="Foliennummernplatzhalter 4"/>
+          <p:cNvSpPr>
+            <a:spLocks noGrp="1"/>
+          </p:cNvSpPr>
+          <p:nvPr>
+            <p:ph type="sldNum" sz="quarter" idx="16"/>
+          </p:nvPr>
+        </p:nvSpPr>
+        <p:spPr/>
+        <p:txBody>
+          <a:bodyPr/>
+          <a:lstStyle/>
+          <a:p>
+            <a:r>
+              <a:rPr lang="en-US" smtClean="0"/>
+              <a:t>Slide </a:t>
+            </a:r>
+            <a:fld id="{91D913BA-B0D8-4B51-9328-DFAA0B370309}" type="slidenum">
+              <a:rPr lang="en-US" b="1" smtClean="0"/>
+              <a:pPr/>
+              <a:t>6</a:t>
+            </a:fld>
+            <a:endParaRPr lang="en-US" b="1" dirty="0"/>
+          </a:p>
+        </p:txBody>
+      </p:sp>
+      <p:sp>
+        <p:nvSpPr>
+          <p:cNvPr id="6" name="Titel 5"/>
+          <p:cNvSpPr>
+            <a:spLocks noGrp="1"/>
+          </p:cNvSpPr>
+          <p:nvPr>
+            <p:ph type="title"/>
+          </p:nvPr>
+        </p:nvSpPr>
+        <p:spPr/>
+        <p:txBody>
+          <a:bodyPr/>
+          <a:lstStyle/>
+          <a:p>
+            <a:r>
+              <a:rPr lang="de-DE" dirty="0" err="1"/>
+              <a:t>Nested</a:t>
+            </a:r>
+            <a:r>
+              <a:rPr lang="de-DE" dirty="0"/>
+              <a:t> </a:t>
+            </a:r>
+            <a:r>
+              <a:rPr lang="de-DE" dirty="0" err="1"/>
+              <a:t>Virtualization</a:t>
+            </a:r>
+            <a:endParaRPr lang="de-DE" dirty="0"/>
+          </a:p>
+        </p:txBody>
+      </p:sp>
+      <p:pic>
+        <p:nvPicPr>
+          <p:cNvPr id="7" name="Picture 2"/>
+          <p:cNvPicPr>
+            <a:picLocks noChangeAspect="1" noChangeArrowheads="1"/>
+          </p:cNvPicPr>
+          <p:nvPr/>
+        </p:nvPicPr>
+        <p:blipFill>
+          <a:blip r:embed="rId2">
+            <a:extLst>
+              <a:ext uri="{28A0092B-C50C-407E-A947-70E740481C1C}">
+                <a14:useLocalDpi xmlns:a14="http://schemas.microsoft.com/office/drawing/2010/main" val="0"/>
+              </a:ext>
+            </a:extLst>
+          </a:blip>
+          <a:srcRect/>
+          <a:stretch>
+            <a:fillRect/>
+          </a:stretch>
+        </p:blipFill>
+        <p:spPr bwMode="auto">
+          <a:xfrm>
+            <a:off x="358776" y="1237530"/>
+            <a:ext cx="6517480" cy="3568268"/>
+          </a:xfrm>
+          <a:prstGeom prst="rect">
+            <a:avLst/>
+          </a:prstGeom>
+          <a:noFill/>
+          <a:ln>
+            <a:noFill/>
+          </a:ln>
+          <a:extLst>
+            <a:ext uri="{909E8E84-426E-40DD-AFC4-6F175D3DCCD1}">
+              <a14:hiddenFill xmlns:a14="http://schemas.microsoft.com/office/drawing/2010/main">
+                <a:solidFill>
+                  <a:schemeClr val="accent1"/>
+                </a:solidFill>
+              </a14:hiddenFill>
+            </a:ext>
+            <a:ext uri="{91240B29-F687-4F45-9708-019B960494DF}">
+              <a14:hiddenLine xmlns:a14="http://schemas.microsoft.com/office/drawing/2010/main" w="9525">
+                <a:solidFill>
+                  <a:schemeClr val="tx1"/>
+                </a:solidFill>
+                <a:miter lim="800000"/>
+                <a:headEnd/>
+                <a:tailEnd/>
+              </a14:hiddenLine>
+            </a:ext>
+          </a:extLst>
+        </p:spPr>
+      </p:pic>
+      <p:sp>
+        <p:nvSpPr>
+          <p:cNvPr id="8" name="Textfeld 7"/>
+          <p:cNvSpPr txBox="1"/>
+          <p:nvPr/>
+        </p:nvSpPr>
+        <p:spPr bwMode="gray">
+          <a:xfrm>
+            <a:off x="358776" y="4876006"/>
+            <a:ext cx="6661496" cy="267494"/>
+          </a:xfrm>
+          <a:prstGeom prst="rect">
+            <a:avLst/>
+          </a:prstGeom>
+          <a:noFill/>
+        </p:spPr>
+        <p:txBody>
+          <a:bodyPr wrap="square" lIns="0" tIns="0" rIns="0" bIns="0" rtlCol="0">
+            <a:noAutofit/>
+          </a:bodyPr>
+          <a:lstStyle/>
+          <a:p>
+            <a:r>
+              <a:rPr lang="de-DE" sz="900" dirty="0">
+                <a:hlinkClick r:id="rId3"/>
+              </a:rPr>
+              <a:t>http://www.linux-kvm.org/wiki/images/e/e9/Kvm-forum-2013-nested-virtualization-shadow-turtles.pdf</a:t>
+            </a:r>
+            <a:endParaRPr lang="de-DE" sz="900" dirty="0"/>
+          </a:p>
+          <a:p>
+            <a:r>
+              <a:rPr lang="de-DE" sz="1200" dirty="0"/>
+              <a:t/>
+            </a:r>
+            <a:br>
+              <a:rPr lang="de-DE" sz="1200" dirty="0"/>
+            </a:br>
+            <a:endParaRPr lang="de-DE" sz="1200" dirty="0"/>
+          </a:p>
+          <a:p>
+            <a:pPr marL="182563" indent="-182563">
+              <a:spcBef>
+                <a:spcPts val="300"/>
+              </a:spcBef>
+              <a:spcAft>
+                <a:spcPts val="300"/>
+              </a:spcAft>
+              <a:buClr>
+                <a:schemeClr val="accent1"/>
+              </a:buClr>
+              <a:buSzPct val="90000"/>
+              <a:buFont typeface="Arial" panose="020B0604020202020204" pitchFamily="34" charset="0"/>
+              <a:buChar char="■"/>
+            </a:pPr>
+            <a:endParaRPr lang="de-DE" sz="1200" dirty="0" err="1" smtClean="0"/>
+          </a:p>
+        </p:txBody>
+      </p:sp>
+    </p:spTree>
+    <p:extLst>
+      <p:ext uri="{BB962C8B-B14F-4D97-AF65-F5344CB8AC3E}">
+        <p14:creationId xmlns:p14="http://schemas.microsoft.com/office/powerpoint/2010/main" val="1312828569"/>
       </p:ext>
     </p:extLst>
   </p:cSld>
@@ -13145,7 +13479,7 @@
   <a:extraClrSchemeLst/>
   <a:extLst>
     <a:ext uri="{05A4C25C-085E-4340-85A3-A5531E510DB2}">
-      <thm15:themeFamily xmlns:thm15="http://schemas.microsoft.com/office/thememl/2012/main" xmlns="" name="TEMPLATE_HPI_05_EXP" id="{EEEEA749-3836-4DC6-BA52-AE8D0ADE122A}" vid="{1AF48529-3759-4302-91D0-708D448B88CB}"/>
+      <thm15:themeFamily xmlns="" xmlns:thm15="http://schemas.microsoft.com/office/thememl/2012/main" name="TEMPLATE_HPI_05_EXP" id="{EEEEA749-3836-4DC6-BA52-AE8D0ADE122A}" vid="{1AF48529-3759-4302-91D0-708D448B88CB}"/>
     </a:ext>
   </a:extLst>
 </a:theme>

</xml_diff>